<commit_message>
Update Binary glTF for length in header and buffer byte alignment
</commit_message>
<xml_diff>
--- a/extensions/CESIUM_binary_glTF/Figures.pptx
+++ b/extensions/CESIUM_binary_glTF/Figures.pptx
@@ -288,7 +288,7 @@
           <a:p>
             <a:fld id="{E44376AC-B3C2-8643-B9A3-A6905164CDF3}" type="datetimeFigureOut">
               <a:rPr lang="en-US" smtClean="0"/>
-              <a:t>4/22/15</a:t>
+              <a:t>5/21/15</a:t>
             </a:fld>
             <a:endParaRPr lang="en-US"/>
           </a:p>
@@ -458,7 +458,7 @@
           <a:p>
             <a:fld id="{E44376AC-B3C2-8643-B9A3-A6905164CDF3}" type="datetimeFigureOut">
               <a:rPr lang="en-US" smtClean="0"/>
-              <a:t>4/22/15</a:t>
+              <a:t>5/21/15</a:t>
             </a:fld>
             <a:endParaRPr lang="en-US"/>
           </a:p>
@@ -638,7 +638,7 @@
           <a:p>
             <a:fld id="{E44376AC-B3C2-8643-B9A3-A6905164CDF3}" type="datetimeFigureOut">
               <a:rPr lang="en-US" smtClean="0"/>
-              <a:t>4/22/15</a:t>
+              <a:t>5/21/15</a:t>
             </a:fld>
             <a:endParaRPr lang="en-US"/>
           </a:p>
@@ -808,7 +808,7 @@
           <a:p>
             <a:fld id="{E44376AC-B3C2-8643-B9A3-A6905164CDF3}" type="datetimeFigureOut">
               <a:rPr lang="en-US" smtClean="0"/>
-              <a:t>4/22/15</a:t>
+              <a:t>5/21/15</a:t>
             </a:fld>
             <a:endParaRPr lang="en-US"/>
           </a:p>
@@ -1054,7 +1054,7 @@
           <a:p>
             <a:fld id="{E44376AC-B3C2-8643-B9A3-A6905164CDF3}" type="datetimeFigureOut">
               <a:rPr lang="en-US" smtClean="0"/>
-              <a:t>4/22/15</a:t>
+              <a:t>5/21/15</a:t>
             </a:fld>
             <a:endParaRPr lang="en-US"/>
           </a:p>
@@ -1342,7 +1342,7 @@
           <a:p>
             <a:fld id="{E44376AC-B3C2-8643-B9A3-A6905164CDF3}" type="datetimeFigureOut">
               <a:rPr lang="en-US" smtClean="0"/>
-              <a:t>4/22/15</a:t>
+              <a:t>5/21/15</a:t>
             </a:fld>
             <a:endParaRPr lang="en-US"/>
           </a:p>
@@ -1764,7 +1764,7 @@
           <a:p>
             <a:fld id="{E44376AC-B3C2-8643-B9A3-A6905164CDF3}" type="datetimeFigureOut">
               <a:rPr lang="en-US" smtClean="0"/>
-              <a:t>4/22/15</a:t>
+              <a:t>5/21/15</a:t>
             </a:fld>
             <a:endParaRPr lang="en-US"/>
           </a:p>
@@ -1882,7 +1882,7 @@
           <a:p>
             <a:fld id="{E44376AC-B3C2-8643-B9A3-A6905164CDF3}" type="datetimeFigureOut">
               <a:rPr lang="en-US" smtClean="0"/>
-              <a:t>4/22/15</a:t>
+              <a:t>5/21/15</a:t>
             </a:fld>
             <a:endParaRPr lang="en-US"/>
           </a:p>
@@ -1977,7 +1977,7 @@
           <a:p>
             <a:fld id="{E44376AC-B3C2-8643-B9A3-A6905164CDF3}" type="datetimeFigureOut">
               <a:rPr lang="en-US" smtClean="0"/>
-              <a:t>4/22/15</a:t>
+              <a:t>5/21/15</a:t>
             </a:fld>
             <a:endParaRPr lang="en-US"/>
           </a:p>
@@ -2254,7 +2254,7 @@
           <a:p>
             <a:fld id="{E44376AC-B3C2-8643-B9A3-A6905164CDF3}" type="datetimeFigureOut">
               <a:rPr lang="en-US" smtClean="0"/>
-              <a:t>4/22/15</a:t>
+              <a:t>5/21/15</a:t>
             </a:fld>
             <a:endParaRPr lang="en-US"/>
           </a:p>
@@ -2507,7 +2507,7 @@
           <a:p>
             <a:fld id="{E44376AC-B3C2-8643-B9A3-A6905164CDF3}" type="datetimeFigureOut">
               <a:rPr lang="en-US" smtClean="0"/>
-              <a:t>4/22/15</a:t>
+              <a:t>5/21/15</a:t>
             </a:fld>
             <a:endParaRPr lang="en-US"/>
           </a:p>
@@ -2720,7 +2720,7 @@
           <a:p>
             <a:fld id="{E44376AC-B3C2-8643-B9A3-A6905164CDF3}" type="datetimeFigureOut">
               <a:rPr lang="en-US" smtClean="0"/>
-              <a:t>4/22/15</a:t>
+              <a:t>5/21/15</a:t>
             </a:fld>
             <a:endParaRPr lang="en-US"/>
           </a:p>
@@ -3103,7 +3103,7 @@
         </p:nvSpPr>
         <p:spPr>
           <a:xfrm>
-            <a:off x="109807" y="656345"/>
+            <a:off x="109807" y="662695"/>
             <a:ext cx="1846930" cy="461665"/>
           </a:xfrm>
           <a:prstGeom prst="rect">
@@ -3179,7 +3179,7 @@
         </p:nvSpPr>
         <p:spPr>
           <a:xfrm>
-            <a:off x="1956737" y="656345"/>
+            <a:off x="1956737" y="662695"/>
             <a:ext cx="923450" cy="461665"/>
           </a:xfrm>
           <a:prstGeom prst="rect">
@@ -3251,7 +3251,7 @@
         </p:nvSpPr>
         <p:spPr>
           <a:xfrm>
-            <a:off x="2880187" y="656345"/>
+            <a:off x="3813235" y="662695"/>
             <a:ext cx="1108146" cy="461665"/>
           </a:xfrm>
           <a:prstGeom prst="rect">
@@ -3320,7 +3320,7 @@
         </p:nvSpPr>
         <p:spPr>
           <a:xfrm>
-            <a:off x="3988333" y="656345"/>
+            <a:off x="4921381" y="662695"/>
             <a:ext cx="1108146" cy="461665"/>
           </a:xfrm>
           <a:prstGeom prst="rect">
@@ -3389,7 +3389,7 @@
         </p:nvSpPr>
         <p:spPr>
           <a:xfrm>
-            <a:off x="6019929" y="656345"/>
+            <a:off x="6952977" y="662695"/>
             <a:ext cx="831102" cy="461665"/>
           </a:xfrm>
           <a:prstGeom prst="rect">
@@ -3458,7 +3458,7 @@
         </p:nvSpPr>
         <p:spPr>
           <a:xfrm>
-            <a:off x="5096479" y="656345"/>
+            <a:off x="6029527" y="662695"/>
             <a:ext cx="923450" cy="461665"/>
           </a:xfrm>
           <a:prstGeom prst="rect">
@@ -3511,7 +3511,7 @@
         </p:nvSpPr>
         <p:spPr>
           <a:xfrm>
-            <a:off x="6851031" y="656345"/>
+            <a:off x="7784079" y="662695"/>
             <a:ext cx="923450" cy="461665"/>
           </a:xfrm>
           <a:prstGeom prst="rect">
@@ -3564,7 +3564,7 @@
         </p:nvSpPr>
         <p:spPr>
           <a:xfrm>
-            <a:off x="5768003" y="1875195"/>
+            <a:off x="6701051" y="1888153"/>
             <a:ext cx="1342573" cy="616860"/>
           </a:xfrm>
           <a:prstGeom prst="ellipse">
@@ -3616,7 +3616,7 @@
         <p:spPr>
           <a:xfrm>
             <a:off x="109807" y="399926"/>
-            <a:ext cx="4986672" cy="0"/>
+            <a:ext cx="5919720" cy="0"/>
           </a:xfrm>
           <a:prstGeom prst="straightConnector1">
             <a:avLst/>
@@ -3652,7 +3652,7 @@
         </p:nvSpPr>
         <p:spPr>
           <a:xfrm>
-            <a:off x="1864374" y="122927"/>
+            <a:off x="2330898" y="122927"/>
             <a:ext cx="1477538" cy="276999"/>
           </a:xfrm>
           <a:prstGeom prst="rect">
@@ -3676,7 +3676,14 @@
                 <a:latin typeface="Courier New"/>
                 <a:cs typeface="Courier New"/>
               </a:rPr>
-              <a:t>16-byte header</a:t>
+              <a:t>20-</a:t>
+            </a:r>
+            <a:r>
+              <a:rPr lang="en-US" sz="1200" dirty="0" smtClean="0">
+                <a:latin typeface="Courier New"/>
+                <a:cs typeface="Courier New"/>
+              </a:rPr>
+              <a:t>byte header</a:t>
             </a:r>
             <a:endParaRPr lang="en-US" sz="1200" dirty="0">
               <a:latin typeface="Courier New"/>
@@ -3693,7 +3700,7 @@
         </p:nvCxnSpPr>
         <p:spPr>
           <a:xfrm>
-            <a:off x="5096479" y="399926"/>
+            <a:off x="6029527" y="399926"/>
             <a:ext cx="2678002" cy="0"/>
           </a:xfrm>
           <a:prstGeom prst="straightConnector1">
@@ -3730,7 +3737,7 @@
         </p:nvSpPr>
         <p:spPr>
           <a:xfrm>
-            <a:off x="6157199" y="108497"/>
+            <a:off x="7090247" y="108497"/>
             <a:ext cx="556563" cy="276999"/>
           </a:xfrm>
           <a:prstGeom prst="rect">
@@ -3766,15 +3773,12 @@
       <p:cxnSp>
         <p:nvCxnSpPr>
           <p:cNvPr id="23" name="Curved Connector 22"/>
-          <p:cNvCxnSpPr>
-            <a:stCxn id="8" idx="2"/>
-            <a:endCxn id="10" idx="2"/>
-          </p:cNvCxnSpPr>
+          <p:cNvCxnSpPr/>
           <p:nvPr/>
         </p:nvCxnSpPr>
         <p:spPr>
           <a:xfrm rot="16200000" flipH="1">
-            <a:off x="6874118" y="679372"/>
+            <a:off x="7807166" y="692330"/>
             <a:ext cx="12700" cy="877276"/>
           </a:xfrm>
           <a:prstGeom prst="curvedConnector3">
@@ -3807,15 +3811,12 @@
       <p:cxnSp>
         <p:nvCxnSpPr>
           <p:cNvPr id="24" name="Curved Connector 23"/>
-          <p:cNvCxnSpPr>
-            <a:stCxn id="8" idx="2"/>
-            <a:endCxn id="9" idx="2"/>
-          </p:cNvCxnSpPr>
+          <p:cNvCxnSpPr/>
           <p:nvPr/>
         </p:nvCxnSpPr>
         <p:spPr>
           <a:xfrm rot="5400000">
-            <a:off x="5996842" y="679372"/>
+            <a:off x="6929890" y="692330"/>
             <a:ext cx="12700" cy="877276"/>
           </a:xfrm>
           <a:prstGeom prst="curvedConnector3">
@@ -3849,15 +3850,14 @@
         <p:nvCxnSpPr>
           <p:cNvPr id="35" name="Straight Arrow Connector 34"/>
           <p:cNvCxnSpPr>
-            <a:stCxn id="8" idx="2"/>
             <a:endCxn id="11" idx="0"/>
           </p:cNvCxnSpPr>
           <p:nvPr/>
         </p:nvCxnSpPr>
         <p:spPr>
           <a:xfrm>
-            <a:off x="6435480" y="1118010"/>
-            <a:ext cx="3810" cy="757185"/>
+            <a:off x="7368528" y="1137318"/>
+            <a:ext cx="3810" cy="750835"/>
           </a:xfrm>
           <a:prstGeom prst="straightConnector1">
             <a:avLst/>
@@ -3892,7 +3892,7 @@
         </p:nvSpPr>
         <p:spPr>
           <a:xfrm>
-            <a:off x="6401972" y="1369090"/>
+            <a:off x="7335020" y="1382048"/>
             <a:ext cx="1031189" cy="246221"/>
           </a:xfrm>
           <a:prstGeom prst="rect">
@@ -3919,6 +3919,82 @@
               <a:t>bufferViews</a:t>
             </a:r>
             <a:endParaRPr lang="en-US" sz="1000" dirty="0">
+              <a:latin typeface="Courier New"/>
+              <a:cs typeface="Courier New"/>
+            </a:endParaRPr>
+          </a:p>
+        </p:txBody>
+      </p:sp>
+      <p:sp>
+        <p:nvSpPr>
+          <p:cNvPr id="18" name="TextBox 17"/>
+          <p:cNvSpPr txBox="1"/>
+          <p:nvPr/>
+        </p:nvSpPr>
+        <p:spPr>
+          <a:xfrm>
+            <a:off x="2880187" y="662695"/>
+            <a:ext cx="923450" cy="461665"/>
+          </a:xfrm>
+          <a:prstGeom prst="rect">
+            <a:avLst/>
+          </a:prstGeom>
+          <a:noFill/>
+          <a:ln w="12700" cmpd="sng">
+            <a:solidFill>
+              <a:schemeClr val="tx1"/>
+            </a:solidFill>
+          </a:ln>
+        </p:spPr>
+        <p:txBody>
+          <a:bodyPr wrap="none" rtlCol="0">
+            <a:spAutoFit/>
+          </a:bodyPr>
+          <a:lstStyle/>
+          <a:p>
+            <a:pPr algn="ctr"/>
+            <a:r>
+              <a:rPr lang="en-US" sz="1200" dirty="0" smtClean="0">
+                <a:latin typeface="Courier New"/>
+                <a:cs typeface="Courier New"/>
+              </a:rPr>
+              <a:t>length</a:t>
+            </a:r>
+            <a:endParaRPr lang="en-US" sz="1200" dirty="0" smtClean="0">
+              <a:latin typeface="Courier New"/>
+              <a:cs typeface="Courier New"/>
+            </a:endParaRPr>
+          </a:p>
+          <a:p>
+            <a:pPr algn="ctr"/>
+            <a:r>
+              <a:rPr lang="en-US" sz="1200" dirty="0" smtClean="0">
+                <a:latin typeface="Courier New"/>
+                <a:cs typeface="Courier New"/>
+              </a:rPr>
+              <a:t>(</a:t>
+            </a:r>
+            <a:r>
+              <a:rPr lang="en-US" sz="1200" dirty="0" smtClean="0">
+                <a:solidFill>
+                  <a:schemeClr val="tx2">
+                    <a:lumMod val="60000"/>
+                    <a:lumOff val="40000"/>
+                  </a:schemeClr>
+                </a:solidFill>
+                <a:latin typeface="Courier New"/>
+                <a:cs typeface="Courier New"/>
+              </a:rPr>
+              <a:t>uint32</a:t>
+            </a:r>
+            <a:r>
+              <a:rPr lang="en-US" sz="1200" dirty="0" smtClean="0">
+                <a:latin typeface="Courier New"/>
+                <a:cs typeface="Courier New"/>
+              </a:rPr>
+              <a:t>)</a:t>
+            </a:r>
+            <a:endParaRPr lang="en-US" sz="1200" dirty="0">
               <a:latin typeface="Courier New"/>
               <a:cs typeface="Courier New"/>
             </a:endParaRPr>

</xml_diff>